<commit_message>
For class on switching in small set
</commit_message>
<xml_diff>
--- a/7.Bregman/aBoutBregman/Online Via Bregman.pptx
+++ b/7.Bregman/aBoutBregman/Online Via Bregman.pptx
@@ -106,18 +106,7 @@
   </p:defaultTextStyle>
   <p:extLst>
     <p:ext uri="{EFAFB233-063F-42B5-8137-9DF3F51BA10A}">
-      <p15:sldGuideLst xmlns:p15="http://schemas.microsoft.com/office/powerpoint/2012/main">
-        <p15:guide id="1" orient="horz" pos="2160" userDrawn="1">
-          <p15:clr>
-            <a:srgbClr val="A4A3A4"/>
-          </p15:clr>
-        </p15:guide>
-        <p15:guide id="2" pos="3840" userDrawn="1">
-          <p15:clr>
-            <a:srgbClr val="A4A3A4"/>
-          </p15:clr>
-        </p15:guide>
-      </p15:sldGuideLst>
+      <p15:sldGuideLst xmlns:p15="http://schemas.microsoft.com/office/powerpoint/2012/main"/>
     </p:ext>
   </p:extLst>
 </p:presentation>
@@ -165,10 +154,9 @@
           </a:lstStyle>
           <a:p>
             <a:r>
-              <a:rPr lang="en-US" smtClean="0"/>
+              <a:rPr lang="en-US"/>
               <a:t>Click to edit Master title style</a:t>
             </a:r>
-            <a:endParaRPr lang="en-US"/>
           </a:p>
         </p:txBody>
       </p:sp>
@@ -230,10 +218,9 @@
           </a:lstStyle>
           <a:p>
             <a:r>
-              <a:rPr lang="en-US" smtClean="0"/>
+              <a:rPr lang="en-US"/>
               <a:t>Click to edit Master subtitle style</a:t>
             </a:r>
-            <a:endParaRPr lang="en-US"/>
           </a:p>
         </p:txBody>
       </p:sp>
@@ -254,7 +241,7 @@
           <a:p>
             <a:fld id="{7ACAB673-170D-D644-A5C9-6C988CDC9129}" type="datetimeFigureOut">
               <a:rPr lang="en-US" smtClean="0"/>
-              <a:t>2/1/18</a:t>
+              <a:t>1/29/20</a:t>
             </a:fld>
             <a:endParaRPr lang="en-US"/>
           </a:p>
@@ -348,10 +335,9 @@
           <a:lstStyle/>
           <a:p>
             <a:r>
-              <a:rPr lang="en-US" smtClean="0"/>
+              <a:rPr lang="en-US"/>
               <a:t>Click to edit Master title style</a:t>
             </a:r>
-            <a:endParaRPr lang="en-US"/>
           </a:p>
         </p:txBody>
       </p:sp>
@@ -372,38 +358,37 @@
           <a:p>
             <a:pPr lvl="0"/>
             <a:r>
-              <a:rPr lang="en-US" smtClean="0"/>
+              <a:rPr lang="en-US"/>
               <a:t>Click to edit Master text styles</a:t>
             </a:r>
           </a:p>
           <a:p>
             <a:pPr lvl="1"/>
             <a:r>
-              <a:rPr lang="en-US" smtClean="0"/>
+              <a:rPr lang="en-US"/>
               <a:t>Second level</a:t>
             </a:r>
           </a:p>
           <a:p>
             <a:pPr lvl="2"/>
             <a:r>
-              <a:rPr lang="en-US" smtClean="0"/>
+              <a:rPr lang="en-US"/>
               <a:t>Third level</a:t>
             </a:r>
           </a:p>
           <a:p>
             <a:pPr lvl="3"/>
             <a:r>
-              <a:rPr lang="en-US" smtClean="0"/>
+              <a:rPr lang="en-US"/>
               <a:t>Fourth level</a:t>
             </a:r>
           </a:p>
           <a:p>
             <a:pPr lvl="4"/>
             <a:r>
-              <a:rPr lang="en-US" smtClean="0"/>
+              <a:rPr lang="en-US"/>
               <a:t>Fifth level</a:t>
             </a:r>
-            <a:endParaRPr lang="en-US"/>
           </a:p>
         </p:txBody>
       </p:sp>
@@ -424,7 +409,7 @@
           <a:p>
             <a:fld id="{7ACAB673-170D-D644-A5C9-6C988CDC9129}" type="datetimeFigureOut">
               <a:rPr lang="en-US" smtClean="0"/>
-              <a:t>2/1/18</a:t>
+              <a:t>1/29/20</a:t>
             </a:fld>
             <a:endParaRPr lang="en-US"/>
           </a:p>
@@ -523,10 +508,9 @@
           <a:lstStyle/>
           <a:p>
             <a:r>
-              <a:rPr lang="en-US" smtClean="0"/>
+              <a:rPr lang="en-US"/>
               <a:t>Click to edit Master title style</a:t>
             </a:r>
-            <a:endParaRPr lang="en-US"/>
           </a:p>
         </p:txBody>
       </p:sp>
@@ -552,38 +536,37 @@
           <a:p>
             <a:pPr lvl="0"/>
             <a:r>
-              <a:rPr lang="en-US" smtClean="0"/>
+              <a:rPr lang="en-US"/>
               <a:t>Click to edit Master text styles</a:t>
             </a:r>
           </a:p>
           <a:p>
             <a:pPr lvl="1"/>
             <a:r>
-              <a:rPr lang="en-US" smtClean="0"/>
+              <a:rPr lang="en-US"/>
               <a:t>Second level</a:t>
             </a:r>
           </a:p>
           <a:p>
             <a:pPr lvl="2"/>
             <a:r>
-              <a:rPr lang="en-US" smtClean="0"/>
+              <a:rPr lang="en-US"/>
               <a:t>Third level</a:t>
             </a:r>
           </a:p>
           <a:p>
             <a:pPr lvl="3"/>
             <a:r>
-              <a:rPr lang="en-US" smtClean="0"/>
+              <a:rPr lang="en-US"/>
               <a:t>Fourth level</a:t>
             </a:r>
           </a:p>
           <a:p>
             <a:pPr lvl="4"/>
             <a:r>
-              <a:rPr lang="en-US" smtClean="0"/>
+              <a:rPr lang="en-US"/>
               <a:t>Fifth level</a:t>
             </a:r>
-            <a:endParaRPr lang="en-US"/>
           </a:p>
         </p:txBody>
       </p:sp>
@@ -604,7 +587,7 @@
           <a:p>
             <a:fld id="{7ACAB673-170D-D644-A5C9-6C988CDC9129}" type="datetimeFigureOut">
               <a:rPr lang="en-US" smtClean="0"/>
-              <a:t>2/1/18</a:t>
+              <a:t>1/29/20</a:t>
             </a:fld>
             <a:endParaRPr lang="en-US"/>
           </a:p>
@@ -698,10 +681,9 @@
           <a:lstStyle/>
           <a:p>
             <a:r>
-              <a:rPr lang="en-US" smtClean="0"/>
+              <a:rPr lang="en-US"/>
               <a:t>Click to edit Master title style</a:t>
             </a:r>
-            <a:endParaRPr lang="en-US"/>
           </a:p>
         </p:txBody>
       </p:sp>
@@ -722,38 +704,37 @@
           <a:p>
             <a:pPr lvl="0"/>
             <a:r>
-              <a:rPr lang="en-US" smtClean="0"/>
+              <a:rPr lang="en-US"/>
               <a:t>Click to edit Master text styles</a:t>
             </a:r>
           </a:p>
           <a:p>
             <a:pPr lvl="1"/>
             <a:r>
-              <a:rPr lang="en-US" smtClean="0"/>
+              <a:rPr lang="en-US"/>
               <a:t>Second level</a:t>
             </a:r>
           </a:p>
           <a:p>
             <a:pPr lvl="2"/>
             <a:r>
-              <a:rPr lang="en-US" smtClean="0"/>
+              <a:rPr lang="en-US"/>
               <a:t>Third level</a:t>
             </a:r>
           </a:p>
           <a:p>
             <a:pPr lvl="3"/>
             <a:r>
-              <a:rPr lang="en-US" smtClean="0"/>
+              <a:rPr lang="en-US"/>
               <a:t>Fourth level</a:t>
             </a:r>
           </a:p>
           <a:p>
             <a:pPr lvl="4"/>
             <a:r>
-              <a:rPr lang="en-US" smtClean="0"/>
+              <a:rPr lang="en-US"/>
               <a:t>Fifth level</a:t>
             </a:r>
-            <a:endParaRPr lang="en-US"/>
           </a:p>
         </p:txBody>
       </p:sp>
@@ -774,7 +755,7 @@
           <a:p>
             <a:fld id="{7ACAB673-170D-D644-A5C9-6C988CDC9129}" type="datetimeFigureOut">
               <a:rPr lang="en-US" smtClean="0"/>
-              <a:t>2/1/18</a:t>
+              <a:t>1/29/20</a:t>
             </a:fld>
             <a:endParaRPr lang="en-US"/>
           </a:p>
@@ -877,10 +858,9 @@
           </a:lstStyle>
           <a:p>
             <a:r>
-              <a:rPr lang="en-US" smtClean="0"/>
+              <a:rPr lang="en-US"/>
               <a:t>Click to edit Master title style</a:t>
             </a:r>
-            <a:endParaRPr lang="en-US"/>
           </a:p>
         </p:txBody>
       </p:sp>
@@ -997,7 +977,7 @@
           <a:p>
             <a:pPr lvl="0"/>
             <a:r>
-              <a:rPr lang="en-US" smtClean="0"/>
+              <a:rPr lang="en-US"/>
               <a:t>Click to edit Master text styles</a:t>
             </a:r>
           </a:p>
@@ -1020,7 +1000,7 @@
           <a:p>
             <a:fld id="{7ACAB673-170D-D644-A5C9-6C988CDC9129}" type="datetimeFigureOut">
               <a:rPr lang="en-US" smtClean="0"/>
-              <a:t>2/1/18</a:t>
+              <a:t>1/29/20</a:t>
             </a:fld>
             <a:endParaRPr lang="en-US"/>
           </a:p>
@@ -1114,10 +1094,9 @@
           <a:lstStyle/>
           <a:p>
             <a:r>
-              <a:rPr lang="en-US" smtClean="0"/>
+              <a:rPr lang="en-US"/>
               <a:t>Click to edit Master title style</a:t>
             </a:r>
-            <a:endParaRPr lang="en-US"/>
           </a:p>
         </p:txBody>
       </p:sp>
@@ -1143,38 +1122,37 @@
           <a:p>
             <a:pPr lvl="0"/>
             <a:r>
-              <a:rPr lang="en-US" smtClean="0"/>
+              <a:rPr lang="en-US"/>
               <a:t>Click to edit Master text styles</a:t>
             </a:r>
           </a:p>
           <a:p>
             <a:pPr lvl="1"/>
             <a:r>
-              <a:rPr lang="en-US" smtClean="0"/>
+              <a:rPr lang="en-US"/>
               <a:t>Second level</a:t>
             </a:r>
           </a:p>
           <a:p>
             <a:pPr lvl="2"/>
             <a:r>
-              <a:rPr lang="en-US" smtClean="0"/>
+              <a:rPr lang="en-US"/>
               <a:t>Third level</a:t>
             </a:r>
           </a:p>
           <a:p>
             <a:pPr lvl="3"/>
             <a:r>
-              <a:rPr lang="en-US" smtClean="0"/>
+              <a:rPr lang="en-US"/>
               <a:t>Fourth level</a:t>
             </a:r>
           </a:p>
           <a:p>
             <a:pPr lvl="4"/>
             <a:r>
-              <a:rPr lang="en-US" smtClean="0"/>
+              <a:rPr lang="en-US"/>
               <a:t>Fifth level</a:t>
             </a:r>
-            <a:endParaRPr lang="en-US"/>
           </a:p>
         </p:txBody>
       </p:sp>
@@ -1200,38 +1178,37 @@
           <a:p>
             <a:pPr lvl="0"/>
             <a:r>
-              <a:rPr lang="en-US" smtClean="0"/>
+              <a:rPr lang="en-US"/>
               <a:t>Click to edit Master text styles</a:t>
             </a:r>
           </a:p>
           <a:p>
             <a:pPr lvl="1"/>
             <a:r>
-              <a:rPr lang="en-US" smtClean="0"/>
+              <a:rPr lang="en-US"/>
               <a:t>Second level</a:t>
             </a:r>
           </a:p>
           <a:p>
             <a:pPr lvl="2"/>
             <a:r>
-              <a:rPr lang="en-US" smtClean="0"/>
+              <a:rPr lang="en-US"/>
               <a:t>Third level</a:t>
             </a:r>
           </a:p>
           <a:p>
             <a:pPr lvl="3"/>
             <a:r>
-              <a:rPr lang="en-US" smtClean="0"/>
+              <a:rPr lang="en-US"/>
               <a:t>Fourth level</a:t>
             </a:r>
           </a:p>
           <a:p>
             <a:pPr lvl="4"/>
             <a:r>
-              <a:rPr lang="en-US" smtClean="0"/>
+              <a:rPr lang="en-US"/>
               <a:t>Fifth level</a:t>
             </a:r>
-            <a:endParaRPr lang="en-US"/>
           </a:p>
         </p:txBody>
       </p:sp>
@@ -1252,7 +1229,7 @@
           <a:p>
             <a:fld id="{7ACAB673-170D-D644-A5C9-6C988CDC9129}" type="datetimeFigureOut">
               <a:rPr lang="en-US" smtClean="0"/>
-              <a:t>2/1/18</a:t>
+              <a:t>1/29/20</a:t>
             </a:fld>
             <a:endParaRPr lang="en-US"/>
           </a:p>
@@ -1351,10 +1328,9 @@
           <a:lstStyle/>
           <a:p>
             <a:r>
-              <a:rPr lang="en-US" smtClean="0"/>
+              <a:rPr lang="en-US"/>
               <a:t>Click to edit Master title style</a:t>
             </a:r>
-            <a:endParaRPr lang="en-US"/>
           </a:p>
         </p:txBody>
       </p:sp>
@@ -1417,7 +1393,7 @@
           <a:p>
             <a:pPr lvl="0"/>
             <a:r>
-              <a:rPr lang="en-US" smtClean="0"/>
+              <a:rPr lang="en-US"/>
               <a:t>Click to edit Master text styles</a:t>
             </a:r>
           </a:p>
@@ -1445,38 +1421,37 @@
           <a:p>
             <a:pPr lvl="0"/>
             <a:r>
-              <a:rPr lang="en-US" smtClean="0"/>
+              <a:rPr lang="en-US"/>
               <a:t>Click to edit Master text styles</a:t>
             </a:r>
           </a:p>
           <a:p>
             <a:pPr lvl="1"/>
             <a:r>
-              <a:rPr lang="en-US" smtClean="0"/>
+              <a:rPr lang="en-US"/>
               <a:t>Second level</a:t>
             </a:r>
           </a:p>
           <a:p>
             <a:pPr lvl="2"/>
             <a:r>
-              <a:rPr lang="en-US" smtClean="0"/>
+              <a:rPr lang="en-US"/>
               <a:t>Third level</a:t>
             </a:r>
           </a:p>
           <a:p>
             <a:pPr lvl="3"/>
             <a:r>
-              <a:rPr lang="en-US" smtClean="0"/>
+              <a:rPr lang="en-US"/>
               <a:t>Fourth level</a:t>
             </a:r>
           </a:p>
           <a:p>
             <a:pPr lvl="4"/>
             <a:r>
-              <a:rPr lang="en-US" smtClean="0"/>
+              <a:rPr lang="en-US"/>
               <a:t>Fifth level</a:t>
             </a:r>
-            <a:endParaRPr lang="en-US"/>
           </a:p>
         </p:txBody>
       </p:sp>
@@ -1539,7 +1514,7 @@
           <a:p>
             <a:pPr lvl="0"/>
             <a:r>
-              <a:rPr lang="en-US" smtClean="0"/>
+              <a:rPr lang="en-US"/>
               <a:t>Click to edit Master text styles</a:t>
             </a:r>
           </a:p>
@@ -1567,38 +1542,37 @@
           <a:p>
             <a:pPr lvl="0"/>
             <a:r>
-              <a:rPr lang="en-US" smtClean="0"/>
+              <a:rPr lang="en-US"/>
               <a:t>Click to edit Master text styles</a:t>
             </a:r>
           </a:p>
           <a:p>
             <a:pPr lvl="1"/>
             <a:r>
-              <a:rPr lang="en-US" smtClean="0"/>
+              <a:rPr lang="en-US"/>
               <a:t>Second level</a:t>
             </a:r>
           </a:p>
           <a:p>
             <a:pPr lvl="2"/>
             <a:r>
-              <a:rPr lang="en-US" smtClean="0"/>
+              <a:rPr lang="en-US"/>
               <a:t>Third level</a:t>
             </a:r>
           </a:p>
           <a:p>
             <a:pPr lvl="3"/>
             <a:r>
-              <a:rPr lang="en-US" smtClean="0"/>
+              <a:rPr lang="en-US"/>
               <a:t>Fourth level</a:t>
             </a:r>
           </a:p>
           <a:p>
             <a:pPr lvl="4"/>
             <a:r>
-              <a:rPr lang="en-US" smtClean="0"/>
+              <a:rPr lang="en-US"/>
               <a:t>Fifth level</a:t>
             </a:r>
-            <a:endParaRPr lang="en-US"/>
           </a:p>
         </p:txBody>
       </p:sp>
@@ -1619,7 +1593,7 @@
           <a:p>
             <a:fld id="{7ACAB673-170D-D644-A5C9-6C988CDC9129}" type="datetimeFigureOut">
               <a:rPr lang="en-US" smtClean="0"/>
-              <a:t>2/1/18</a:t>
+              <a:t>1/29/20</a:t>
             </a:fld>
             <a:endParaRPr lang="en-US"/>
           </a:p>
@@ -1713,10 +1687,9 @@
           <a:lstStyle/>
           <a:p>
             <a:r>
-              <a:rPr lang="en-US" smtClean="0"/>
+              <a:rPr lang="en-US"/>
               <a:t>Click to edit Master title style</a:t>
             </a:r>
-            <a:endParaRPr lang="en-US"/>
           </a:p>
         </p:txBody>
       </p:sp>
@@ -1737,7 +1710,7 @@
           <a:p>
             <a:fld id="{7ACAB673-170D-D644-A5C9-6C988CDC9129}" type="datetimeFigureOut">
               <a:rPr lang="en-US" smtClean="0"/>
-              <a:t>2/1/18</a:t>
+              <a:t>1/29/20</a:t>
             </a:fld>
             <a:endParaRPr lang="en-US"/>
           </a:p>
@@ -1832,7 +1805,7 @@
           <a:p>
             <a:fld id="{7ACAB673-170D-D644-A5C9-6C988CDC9129}" type="datetimeFigureOut">
               <a:rPr lang="en-US" smtClean="0"/>
-              <a:t>2/1/18</a:t>
+              <a:t>1/29/20</a:t>
             </a:fld>
             <a:endParaRPr lang="en-US"/>
           </a:p>
@@ -1935,10 +1908,9 @@
           </a:lstStyle>
           <a:p>
             <a:r>
-              <a:rPr lang="en-US" smtClean="0"/>
+              <a:rPr lang="en-US"/>
               <a:t>Click to edit Master title style</a:t>
             </a:r>
-            <a:endParaRPr lang="en-US"/>
           </a:p>
         </p:txBody>
       </p:sp>
@@ -1992,38 +1964,37 @@
           <a:p>
             <a:pPr lvl="0"/>
             <a:r>
-              <a:rPr lang="en-US" smtClean="0"/>
+              <a:rPr lang="en-US"/>
               <a:t>Click to edit Master text styles</a:t>
             </a:r>
           </a:p>
           <a:p>
             <a:pPr lvl="1"/>
             <a:r>
-              <a:rPr lang="en-US" smtClean="0"/>
+              <a:rPr lang="en-US"/>
               <a:t>Second level</a:t>
             </a:r>
           </a:p>
           <a:p>
             <a:pPr lvl="2"/>
             <a:r>
-              <a:rPr lang="en-US" smtClean="0"/>
+              <a:rPr lang="en-US"/>
               <a:t>Third level</a:t>
             </a:r>
           </a:p>
           <a:p>
             <a:pPr lvl="3"/>
             <a:r>
-              <a:rPr lang="en-US" smtClean="0"/>
+              <a:rPr lang="en-US"/>
               <a:t>Fourth level</a:t>
             </a:r>
           </a:p>
           <a:p>
             <a:pPr lvl="4"/>
             <a:r>
-              <a:rPr lang="en-US" smtClean="0"/>
+              <a:rPr lang="en-US"/>
               <a:t>Fifth level</a:t>
             </a:r>
-            <a:endParaRPr lang="en-US"/>
           </a:p>
         </p:txBody>
       </p:sp>
@@ -2086,7 +2057,7 @@
           <a:p>
             <a:pPr lvl="0"/>
             <a:r>
-              <a:rPr lang="en-US" smtClean="0"/>
+              <a:rPr lang="en-US"/>
               <a:t>Click to edit Master text styles</a:t>
             </a:r>
           </a:p>
@@ -2109,7 +2080,7 @@
           <a:p>
             <a:fld id="{7ACAB673-170D-D644-A5C9-6C988CDC9129}" type="datetimeFigureOut">
               <a:rPr lang="en-US" smtClean="0"/>
-              <a:t>2/1/18</a:t>
+              <a:t>1/29/20</a:t>
             </a:fld>
             <a:endParaRPr lang="en-US"/>
           </a:p>
@@ -2212,10 +2183,9 @@
           </a:lstStyle>
           <a:p>
             <a:r>
-              <a:rPr lang="en-US" smtClean="0"/>
+              <a:rPr lang="en-US"/>
               <a:t>Click to edit Master title style</a:t>
             </a:r>
-            <a:endParaRPr lang="en-US"/>
           </a:p>
         </p:txBody>
       </p:sp>
@@ -2339,7 +2309,7 @@
           <a:p>
             <a:pPr lvl="0"/>
             <a:r>
-              <a:rPr lang="en-US" smtClean="0"/>
+              <a:rPr lang="en-US"/>
               <a:t>Click to edit Master text styles</a:t>
             </a:r>
           </a:p>
@@ -2362,7 +2332,7 @@
           <a:p>
             <a:fld id="{7ACAB673-170D-D644-A5C9-6C988CDC9129}" type="datetimeFigureOut">
               <a:rPr lang="en-US" smtClean="0"/>
-              <a:t>2/1/18</a:t>
+              <a:t>1/29/20</a:t>
             </a:fld>
             <a:endParaRPr lang="en-US"/>
           </a:p>
@@ -2471,10 +2441,9 @@
           <a:lstStyle/>
           <a:p>
             <a:r>
-              <a:rPr lang="en-US" smtClean="0"/>
+              <a:rPr lang="en-US"/>
               <a:t>Click to edit Master title style</a:t>
             </a:r>
-            <a:endParaRPr lang="en-US"/>
           </a:p>
         </p:txBody>
       </p:sp>
@@ -2505,38 +2474,37 @@
           <a:p>
             <a:pPr lvl="0"/>
             <a:r>
-              <a:rPr lang="en-US" smtClean="0"/>
+              <a:rPr lang="en-US"/>
               <a:t>Click to edit Master text styles</a:t>
             </a:r>
           </a:p>
           <a:p>
             <a:pPr lvl="1"/>
             <a:r>
-              <a:rPr lang="en-US" smtClean="0"/>
+              <a:rPr lang="en-US"/>
               <a:t>Second level</a:t>
             </a:r>
           </a:p>
           <a:p>
             <a:pPr lvl="2"/>
             <a:r>
-              <a:rPr lang="en-US" smtClean="0"/>
+              <a:rPr lang="en-US"/>
               <a:t>Third level</a:t>
             </a:r>
           </a:p>
           <a:p>
             <a:pPr lvl="3"/>
             <a:r>
-              <a:rPr lang="en-US" smtClean="0"/>
+              <a:rPr lang="en-US"/>
               <a:t>Fourth level</a:t>
             </a:r>
           </a:p>
           <a:p>
             <a:pPr lvl="4"/>
             <a:r>
-              <a:rPr lang="en-US" smtClean="0"/>
+              <a:rPr lang="en-US"/>
               <a:t>Fifth level</a:t>
             </a:r>
-            <a:endParaRPr lang="en-US"/>
           </a:p>
         </p:txBody>
       </p:sp>
@@ -2575,7 +2543,7 @@
           <a:p>
             <a:fld id="{7ACAB673-170D-D644-A5C9-6C988CDC9129}" type="datetimeFigureOut">
               <a:rPr lang="en-US" smtClean="0"/>
-              <a:t>2/1/18</a:t>
+              <a:t>1/29/20</a:t>
             </a:fld>
             <a:endParaRPr lang="en-US"/>
           </a:p>
@@ -3157,6 +3125,7 @@
               </a:bodyPr>
               <a:lstStyle/>
               <a:p>
+                <a:pPr/>
                 <a14:m>
                   <m:oMathPara xmlns:m="http://schemas.openxmlformats.org/officeDocument/2006/math">
                     <m:oMathParaPr>
@@ -3165,9 +3134,9 @@
                     <m:oMath xmlns:m="http://schemas.openxmlformats.org/officeDocument/2006/math">
                       <m:r>
                         <a:rPr lang="en-US" sz="2400" b="1" i="1" smtClean="0">
-                          <a:latin typeface="Cambria Math" charset="0"/>
+                          <a:latin typeface="Cambria Math" panose="02040503050406030204" pitchFamily="18" charset="0"/>
                         </a:rPr>
-                        <m:t>𝒖</m:t>
+                        <m:t>𝒒</m:t>
                       </m:r>
                     </m:oMath>
                   </m:oMathPara>
@@ -3194,10 +3163,10 @@
               <a:prstGeom prst="rect">
                 <a:avLst/>
               </a:prstGeom>
-              <a:blipFill rotWithShape="0">
+              <a:blipFill>
                 <a:blip r:embed="rId3"/>
                 <a:stretch>
-                  <a:fillRect/>
+                  <a:fillRect b="-10811"/>
                 </a:stretch>
               </a:blipFill>
             </p:spPr>
@@ -3240,6 +3209,7 @@
               </a:bodyPr>
               <a:lstStyle/>
               <a:p>
+                <a:pPr/>
                 <a14:m>
                   <m:oMathPara xmlns:m="http://schemas.openxmlformats.org/officeDocument/2006/math">
                     <m:oMathParaPr>
@@ -3250,16 +3220,16 @@
                         <m:sSubPr>
                           <m:ctrlPr>
                             <a:rPr lang="en-US" sz="2400" b="1" i="1" smtClean="0">
-                              <a:latin typeface="Cambria Math" charset="0"/>
+                              <a:latin typeface="Cambria Math" panose="02040503050406030204" pitchFamily="18" charset="0"/>
                             </a:rPr>
                           </m:ctrlPr>
                         </m:sSubPr>
                         <m:e>
                           <m:r>
                             <a:rPr lang="en-US" sz="2400" b="1" i="1" smtClean="0">
-                              <a:latin typeface="Cambria Math" charset="0"/>
+                              <a:latin typeface="Cambria Math" panose="02040503050406030204" pitchFamily="18" charset="0"/>
                             </a:rPr>
-                            <m:t>𝒘</m:t>
+                            <m:t>𝒑</m:t>
                           </m:r>
                         </m:e>
                         <m:sub>
@@ -3274,7 +3244,7 @@
                     </m:oMath>
                   </m:oMathPara>
                 </a14:m>
-                <a:endParaRPr lang="en-US" sz="2400" b="1" dirty="0" smtClean="0"/>
+                <a:endParaRPr lang="en-US" sz="2400" b="1" dirty="0"/>
               </a:p>
             </p:txBody>
           </p:sp>
@@ -3296,10 +3266,10 @@
               <a:prstGeom prst="rect">
                 <a:avLst/>
               </a:prstGeom>
-              <a:blipFill rotWithShape="0">
+              <a:blipFill>
                 <a:blip r:embed="rId4"/>
                 <a:stretch>
-                  <a:fillRect b="-1316"/>
+                  <a:fillRect b="-10811"/>
                 </a:stretch>
               </a:blipFill>
             </p:spPr>
@@ -3342,6 +3312,7 @@
               </a:bodyPr>
               <a:lstStyle/>
               <a:p>
+                <a:pPr/>
                 <a14:m>
                   <m:oMathPara xmlns:m="http://schemas.openxmlformats.org/officeDocument/2006/math">
                     <m:oMathParaPr>
@@ -3352,16 +3323,16 @@
                         <m:sSubPr>
                           <m:ctrlPr>
                             <a:rPr lang="en-US" sz="2400" b="1" i="1" smtClean="0">
-                              <a:latin typeface="Cambria Math" charset="0"/>
+                              <a:latin typeface="Cambria Math" panose="02040503050406030204" pitchFamily="18" charset="0"/>
                             </a:rPr>
                           </m:ctrlPr>
                         </m:sSubPr>
                         <m:e>
                           <m:r>
                             <a:rPr lang="en-US" sz="2400" b="1" i="1" smtClean="0">
-                              <a:latin typeface="Cambria Math" charset="0"/>
+                              <a:latin typeface="Cambria Math" panose="02040503050406030204" pitchFamily="18" charset="0"/>
                             </a:rPr>
-                            <m:t>𝒘</m:t>
+                            <m:t>𝒑</m:t>
                           </m:r>
                         </m:e>
                         <m:sub>
@@ -3388,7 +3359,7 @@
                     </m:oMath>
                   </m:oMathPara>
                 </a14:m>
-                <a:endParaRPr lang="en-US" sz="2400" b="1" dirty="0" smtClean="0"/>
+                <a:endParaRPr lang="en-US" sz="2400" b="1" dirty="0"/>
               </a:p>
             </p:txBody>
           </p:sp>
@@ -3410,10 +3381,10 @@
               <a:prstGeom prst="rect">
                 <a:avLst/>
               </a:prstGeom>
-              <a:blipFill rotWithShape="0">
+              <a:blipFill>
                 <a:blip r:embed="rId5"/>
                 <a:stretch>
-                  <a:fillRect r="-22222" b="-2667"/>
+                  <a:fillRect l="-1923" r="-13462" b="-7895"/>
                 </a:stretch>
               </a:blipFill>
             </p:spPr>
@@ -3524,6 +3495,10 @@
             <a:avLst/>
           </a:prstGeom>
           <a:ln w="28575">
+            <a:solidFill>
+              <a:schemeClr val="tx1"/>
+            </a:solidFill>
+            <a:prstDash val="sysDot"/>
             <a:headEnd type="none" w="med" len="med"/>
             <a:tailEnd type="arrow" w="med" len="med"/>
           </a:ln>
@@ -3543,6 +3518,509 @@
           </a:fontRef>
         </p:style>
       </p:cxnSp>
+      <mc:AlternateContent xmlns:mc="http://schemas.openxmlformats.org/markup-compatibility/2006">
+        <mc:Choice xmlns:a14="http://schemas.microsoft.com/office/drawing/2010/main" Requires="a14">
+          <p:sp>
+            <p:nvSpPr>
+              <p:cNvPr id="2" name="TextBox 1">
+                <a:extLst>
+                  <a:ext uri="{FF2B5EF4-FFF2-40B4-BE49-F238E27FC236}">
+                    <a16:creationId xmlns:a16="http://schemas.microsoft.com/office/drawing/2014/main" id="{1369F55F-B08A-3D42-ACE6-27362CBB3CF6}"/>
+                  </a:ext>
+                </a:extLst>
+              </p:cNvPr>
+              <p:cNvSpPr txBox="1"/>
+              <p:nvPr/>
+            </p:nvSpPr>
+            <p:spPr>
+              <a:xfrm>
+                <a:off x="5947043" y="4010568"/>
+                <a:ext cx="1210471" cy="553998"/>
+              </a:xfrm>
+              <a:prstGeom prst="rect">
+                <a:avLst/>
+              </a:prstGeom>
+              <a:noFill/>
+            </p:spPr>
+            <p:txBody>
+              <a:bodyPr wrap="square" lIns="0" tIns="0" rIns="0" bIns="0" rtlCol="0">
+                <a:spAutoFit/>
+              </a:bodyPr>
+              <a:lstStyle/>
+              <a:p>
+                <a14:m>
+                  <m:oMathPara xmlns:m="http://schemas.openxmlformats.org/officeDocument/2006/math">
+                    <m:oMathParaPr>
+                      <m:jc m:val="centerGroup"/>
+                    </m:oMathParaPr>
+                    <m:oMath xmlns:m="http://schemas.openxmlformats.org/officeDocument/2006/math">
+                      <m:r>
+                        <a:rPr lang="en-US" b="1" i="1" smtClean="0">
+                          <a:latin typeface="Cambria Math" panose="02040503050406030204" pitchFamily="18" charset="0"/>
+                        </a:rPr>
+                        <m:t>𝑹𝑬</m:t>
+                      </m:r>
+                      <m:d>
+                        <m:dPr>
+                          <m:ctrlPr>
+                            <a:rPr lang="en-US" b="1" i="1" smtClean="0">
+                              <a:latin typeface="Cambria Math" panose="02040503050406030204" pitchFamily="18" charset="0"/>
+                            </a:rPr>
+                          </m:ctrlPr>
+                        </m:dPr>
+                        <m:e>
+                          <m:r>
+                            <a:rPr lang="en-US" b="1" i="1" smtClean="0">
+                              <a:latin typeface="Cambria Math" panose="02040503050406030204" pitchFamily="18" charset="0"/>
+                            </a:rPr>
+                            <m:t>𝒒</m:t>
+                          </m:r>
+                          <m:r>
+                            <a:rPr lang="en-US" b="1" i="1" smtClean="0">
+                              <a:latin typeface="Cambria Math" panose="02040503050406030204" pitchFamily="18" charset="0"/>
+                            </a:rPr>
+                            <m:t> |</m:t>
+                          </m:r>
+                          <m:sSub>
+                            <m:sSubPr>
+                              <m:ctrlPr>
+                                <a:rPr lang="en-US" b="1" i="1" smtClean="0">
+                                  <a:latin typeface="Cambria Math" panose="02040503050406030204" pitchFamily="18" charset="0"/>
+                                </a:rPr>
+                              </m:ctrlPr>
+                            </m:sSubPr>
+                            <m:e>
+                              <m:r>
+                                <a:rPr lang="en-US" b="1" i="1" smtClean="0">
+                                  <a:latin typeface="Cambria Math" panose="02040503050406030204" pitchFamily="18" charset="0"/>
+                                </a:rPr>
+                                <m:t>| </m:t>
+                              </m:r>
+                              <m:r>
+                                <a:rPr lang="en-US" b="1" i="1" smtClean="0">
+                                  <a:latin typeface="Cambria Math" panose="02040503050406030204" pitchFamily="18" charset="0"/>
+                                </a:rPr>
+                                <m:t>𝒑</m:t>
+                              </m:r>
+                            </m:e>
+                            <m:sub>
+                              <m:r>
+                                <a:rPr lang="en-US" b="1" i="1" smtClean="0">
+                                  <a:latin typeface="Cambria Math" panose="02040503050406030204" pitchFamily="18" charset="0"/>
+                                </a:rPr>
+                                <m:t>𝒕</m:t>
+                              </m:r>
+                            </m:sub>
+                          </m:sSub>
+                        </m:e>
+                      </m:d>
+                    </m:oMath>
+                  </m:oMathPara>
+                </a14:m>
+                <a:endParaRPr lang="en-US" b="1" dirty="0"/>
+              </a:p>
+              <a:p>
+                <a:endParaRPr lang="en-US" dirty="0"/>
+              </a:p>
+            </p:txBody>
+          </p:sp>
+        </mc:Choice>
+        <mc:Fallback>
+          <p:sp>
+            <p:nvSpPr>
+              <p:cNvPr id="2" name="TextBox 1">
+                <a:extLst>
+                  <a:ext uri="{FF2B5EF4-FFF2-40B4-BE49-F238E27FC236}">
+                    <a16:creationId xmlns:a16="http://schemas.microsoft.com/office/drawing/2014/main" id="{1369F55F-B08A-3D42-ACE6-27362CBB3CF6}"/>
+                  </a:ext>
+                </a:extLst>
+              </p:cNvPr>
+              <p:cNvSpPr txBox="1">
+                <a:spLocks noRot="1" noChangeAspect="1" noMove="1" noResize="1" noEditPoints="1" noAdjustHandles="1" noChangeArrowheads="1" noChangeShapeType="1" noTextEdit="1"/>
+              </p:cNvSpPr>
+              <p:nvPr/>
+            </p:nvSpPr>
+            <p:spPr>
+              <a:xfrm>
+                <a:off x="5947043" y="4010568"/>
+                <a:ext cx="1210471" cy="553998"/>
+              </a:xfrm>
+              <a:prstGeom prst="rect">
+                <a:avLst/>
+              </a:prstGeom>
+              <a:blipFill>
+                <a:blip r:embed="rId6"/>
+                <a:stretch>
+                  <a:fillRect l="-2083" t="-4545"/>
+                </a:stretch>
+              </a:blipFill>
+            </p:spPr>
+            <p:txBody>
+              <a:bodyPr/>
+              <a:lstStyle/>
+              <a:p>
+                <a:r>
+                  <a:rPr lang="en-US">
+                    <a:noFill/>
+                  </a:rPr>
+                  <a:t> </a:t>
+                </a:r>
+              </a:p>
+            </p:txBody>
+          </p:sp>
+        </mc:Fallback>
+      </mc:AlternateContent>
+      <mc:AlternateContent xmlns:mc="http://schemas.openxmlformats.org/markup-compatibility/2006">
+        <mc:Choice xmlns:a14="http://schemas.microsoft.com/office/drawing/2010/main" Requires="a14">
+          <p:sp>
+            <p:nvSpPr>
+              <p:cNvPr id="15" name="TextBox 14">
+                <a:extLst>
+                  <a:ext uri="{FF2B5EF4-FFF2-40B4-BE49-F238E27FC236}">
+                    <a16:creationId xmlns:a16="http://schemas.microsoft.com/office/drawing/2014/main" id="{F875D577-DA0E-9A4F-85AF-987C911CAF62}"/>
+                  </a:ext>
+                </a:extLst>
+              </p:cNvPr>
+              <p:cNvSpPr txBox="1"/>
+              <p:nvPr/>
+            </p:nvSpPr>
+            <p:spPr>
+              <a:xfrm>
+                <a:off x="6853857" y="5161079"/>
+                <a:ext cx="1210471" cy="553998"/>
+              </a:xfrm>
+              <a:prstGeom prst="rect">
+                <a:avLst/>
+              </a:prstGeom>
+              <a:noFill/>
+            </p:spPr>
+            <p:txBody>
+              <a:bodyPr wrap="square" lIns="0" tIns="0" rIns="0" bIns="0" rtlCol="0">
+                <a:spAutoFit/>
+              </a:bodyPr>
+              <a:lstStyle/>
+              <a:p>
+                <a14:m>
+                  <m:oMathPara xmlns:m="http://schemas.openxmlformats.org/officeDocument/2006/math">
+                    <m:oMathParaPr>
+                      <m:jc m:val="centerGroup"/>
+                    </m:oMathParaPr>
+                    <m:oMath xmlns:m="http://schemas.openxmlformats.org/officeDocument/2006/math">
+                      <m:r>
+                        <a:rPr lang="en-US" b="1" i="1" smtClean="0">
+                          <a:latin typeface="Cambria Math" panose="02040503050406030204" pitchFamily="18" charset="0"/>
+                        </a:rPr>
+                        <m:t>𝑹𝑬</m:t>
+                      </m:r>
+                      <m:d>
+                        <m:dPr>
+                          <m:ctrlPr>
+                            <a:rPr lang="en-US" b="1" i="1" smtClean="0">
+                              <a:latin typeface="Cambria Math" panose="02040503050406030204" pitchFamily="18" charset="0"/>
+                            </a:rPr>
+                          </m:ctrlPr>
+                        </m:dPr>
+                        <m:e>
+                          <m:r>
+                            <a:rPr lang="en-US" b="1" i="1" smtClean="0">
+                              <a:latin typeface="Cambria Math" panose="02040503050406030204" pitchFamily="18" charset="0"/>
+                            </a:rPr>
+                            <m:t>𝒒</m:t>
+                          </m:r>
+                          <m:r>
+                            <a:rPr lang="en-US" b="1" i="1" smtClean="0">
+                              <a:latin typeface="Cambria Math" panose="02040503050406030204" pitchFamily="18" charset="0"/>
+                            </a:rPr>
+                            <m:t> |</m:t>
+                          </m:r>
+                          <m:sSub>
+                            <m:sSubPr>
+                              <m:ctrlPr>
+                                <a:rPr lang="en-US" b="1" i="1" smtClean="0">
+                                  <a:latin typeface="Cambria Math" panose="02040503050406030204" pitchFamily="18" charset="0"/>
+                                </a:rPr>
+                              </m:ctrlPr>
+                            </m:sSubPr>
+                            <m:e>
+                              <m:r>
+                                <a:rPr lang="en-US" b="1" i="1" smtClean="0">
+                                  <a:latin typeface="Cambria Math" panose="02040503050406030204" pitchFamily="18" charset="0"/>
+                                </a:rPr>
+                                <m:t>| </m:t>
+                              </m:r>
+                              <m:r>
+                                <a:rPr lang="en-US" b="1" i="1" smtClean="0">
+                                  <a:latin typeface="Cambria Math" panose="02040503050406030204" pitchFamily="18" charset="0"/>
+                                </a:rPr>
+                                <m:t>𝒑</m:t>
+                              </m:r>
+                            </m:e>
+                            <m:sub>
+                              <m:r>
+                                <a:rPr lang="en-US" b="1" i="1" smtClean="0">
+                                  <a:latin typeface="Cambria Math" panose="02040503050406030204" pitchFamily="18" charset="0"/>
+                                </a:rPr>
+                                <m:t>𝒕</m:t>
+                              </m:r>
+                              <m:r>
+                                <a:rPr lang="en-US" b="1" i="1" smtClean="0">
+                                  <a:latin typeface="Cambria Math" panose="02040503050406030204" pitchFamily="18" charset="0"/>
+                                </a:rPr>
+                                <m:t>+</m:t>
+                              </m:r>
+                              <m:r>
+                                <a:rPr lang="en-US" b="1" i="1" smtClean="0">
+                                  <a:latin typeface="Cambria Math" panose="02040503050406030204" pitchFamily="18" charset="0"/>
+                                </a:rPr>
+                                <m:t>𝟏</m:t>
+                              </m:r>
+                            </m:sub>
+                          </m:sSub>
+                        </m:e>
+                      </m:d>
+                    </m:oMath>
+                  </m:oMathPara>
+                </a14:m>
+                <a:endParaRPr lang="en-US" b="1" dirty="0"/>
+              </a:p>
+              <a:p>
+                <a:endParaRPr lang="en-US" dirty="0"/>
+              </a:p>
+            </p:txBody>
+          </p:sp>
+        </mc:Choice>
+        <mc:Fallback>
+          <p:sp>
+            <p:nvSpPr>
+              <p:cNvPr id="15" name="TextBox 14">
+                <a:extLst>
+                  <a:ext uri="{FF2B5EF4-FFF2-40B4-BE49-F238E27FC236}">
+                    <a16:creationId xmlns:a16="http://schemas.microsoft.com/office/drawing/2014/main" id="{F875D577-DA0E-9A4F-85AF-987C911CAF62}"/>
+                  </a:ext>
+                </a:extLst>
+              </p:cNvPr>
+              <p:cNvSpPr txBox="1">
+                <a:spLocks noRot="1" noChangeAspect="1" noMove="1" noResize="1" noEditPoints="1" noAdjustHandles="1" noChangeArrowheads="1" noChangeShapeType="1" noTextEdit="1"/>
+              </p:cNvSpPr>
+              <p:nvPr/>
+            </p:nvSpPr>
+            <p:spPr>
+              <a:xfrm>
+                <a:off x="6853857" y="5161079"/>
+                <a:ext cx="1210471" cy="553998"/>
+              </a:xfrm>
+              <a:prstGeom prst="rect">
+                <a:avLst/>
+              </a:prstGeom>
+              <a:blipFill>
+                <a:blip r:embed="rId7"/>
+                <a:stretch>
+                  <a:fillRect l="-7368" t="-2222" r="-7368"/>
+                </a:stretch>
+              </a:blipFill>
+            </p:spPr>
+            <p:txBody>
+              <a:bodyPr/>
+              <a:lstStyle/>
+              <a:p>
+                <a:r>
+                  <a:rPr lang="en-US">
+                    <a:noFill/>
+                  </a:rPr>
+                  <a:t> </a:t>
+                </a:r>
+              </a:p>
+            </p:txBody>
+          </p:sp>
+        </mc:Fallback>
+      </mc:AlternateContent>
+      <mc:AlternateContent xmlns:mc="http://schemas.openxmlformats.org/markup-compatibility/2006">
+        <mc:Choice xmlns:a14="http://schemas.microsoft.com/office/drawing/2010/main" Requires="a14">
+          <p:sp>
+            <p:nvSpPr>
+              <p:cNvPr id="16" name="TextBox 15">
+                <a:extLst>
+                  <a:ext uri="{FF2B5EF4-FFF2-40B4-BE49-F238E27FC236}">
+                    <a16:creationId xmlns:a16="http://schemas.microsoft.com/office/drawing/2014/main" id="{98C218D1-5181-C04D-99ED-1093F1CF3326}"/>
+                  </a:ext>
+                </a:extLst>
+              </p:cNvPr>
+              <p:cNvSpPr txBox="1"/>
+              <p:nvPr/>
+            </p:nvSpPr>
+            <p:spPr>
+              <a:xfrm>
+                <a:off x="2260312" y="4709531"/>
+                <a:ext cx="2111076" cy="830997"/>
+              </a:xfrm>
+              <a:prstGeom prst="rect">
+                <a:avLst/>
+              </a:prstGeom>
+              <a:noFill/>
+            </p:spPr>
+            <p:txBody>
+              <a:bodyPr wrap="square" lIns="0" tIns="0" rIns="0" bIns="0" rtlCol="0">
+                <a:spAutoFit/>
+              </a:bodyPr>
+              <a:lstStyle/>
+              <a:p>
+                <a14:m>
+                  <m:oMathPara xmlns:m="http://schemas.openxmlformats.org/officeDocument/2006/math">
+                    <m:oMathParaPr>
+                      <m:jc m:val="centerGroup"/>
+                    </m:oMathParaPr>
+                    <m:oMath xmlns:m="http://schemas.openxmlformats.org/officeDocument/2006/math">
+                      <m:r>
+                        <a:rPr lang="en-US" b="1" i="1" smtClean="0">
+                          <a:latin typeface="Cambria Math" panose="02040503050406030204" pitchFamily="18" charset="0"/>
+                        </a:rPr>
+                        <m:t>𝑹𝑬</m:t>
+                      </m:r>
+                      <m:d>
+                        <m:dPr>
+                          <m:ctrlPr>
+                            <a:rPr lang="en-US" b="1" i="1" smtClean="0">
+                              <a:latin typeface="Cambria Math" panose="02040503050406030204" pitchFamily="18" charset="0"/>
+                            </a:rPr>
+                          </m:ctrlPr>
+                        </m:dPr>
+                        <m:e>
+                          <m:sSub>
+                            <m:sSubPr>
+                              <m:ctrlPr>
+                                <a:rPr lang="en-US" b="1" i="1" smtClean="0">
+                                  <a:latin typeface="Cambria Math" panose="02040503050406030204" pitchFamily="18" charset="0"/>
+                                </a:rPr>
+                              </m:ctrlPr>
+                            </m:sSubPr>
+                            <m:e>
+                              <m:r>
+                                <a:rPr lang="en-US" b="1" i="1" smtClean="0">
+                                  <a:latin typeface="Cambria Math" panose="02040503050406030204" pitchFamily="18" charset="0"/>
+                                </a:rPr>
+                                <m:t>𝒑</m:t>
+                              </m:r>
+                            </m:e>
+                            <m:sub>
+                              <m:r>
+                                <a:rPr lang="en-US" b="1" i="1" smtClean="0">
+                                  <a:latin typeface="Cambria Math" panose="02040503050406030204" pitchFamily="18" charset="0"/>
+                                </a:rPr>
+                                <m:t>𝒕</m:t>
+                              </m:r>
+                            </m:sub>
+                          </m:sSub>
+                          <m:r>
+                            <a:rPr lang="en-US" b="1" i="1" smtClean="0">
+                              <a:latin typeface="Cambria Math" panose="02040503050406030204" pitchFamily="18" charset="0"/>
+                            </a:rPr>
+                            <m:t> |</m:t>
+                          </m:r>
+                          <m:sSub>
+                            <m:sSubPr>
+                              <m:ctrlPr>
+                                <a:rPr lang="en-US" b="1" i="1" smtClean="0">
+                                  <a:latin typeface="Cambria Math" panose="02040503050406030204" pitchFamily="18" charset="0"/>
+                                </a:rPr>
+                              </m:ctrlPr>
+                            </m:sSubPr>
+                            <m:e>
+                              <m:r>
+                                <a:rPr lang="en-US" b="1" i="1" smtClean="0">
+                                  <a:latin typeface="Cambria Math" panose="02040503050406030204" pitchFamily="18" charset="0"/>
+                                </a:rPr>
+                                <m:t>| </m:t>
+                              </m:r>
+                              <m:r>
+                                <a:rPr lang="en-US" b="1" i="1" smtClean="0">
+                                  <a:latin typeface="Cambria Math" panose="02040503050406030204" pitchFamily="18" charset="0"/>
+                                </a:rPr>
+                                <m:t>𝒑</m:t>
+                              </m:r>
+                            </m:e>
+                            <m:sub>
+                              <m:r>
+                                <a:rPr lang="en-US" b="1" i="1" smtClean="0">
+                                  <a:latin typeface="Cambria Math" panose="02040503050406030204" pitchFamily="18" charset="0"/>
+                                </a:rPr>
+                                <m:t>𝒕</m:t>
+                              </m:r>
+                              <m:r>
+                                <a:rPr lang="en-US" b="1" i="1" smtClean="0">
+                                  <a:latin typeface="Cambria Math" panose="02040503050406030204" pitchFamily="18" charset="0"/>
+                                </a:rPr>
+                                <m:t>+</m:t>
+                              </m:r>
+                              <m:r>
+                                <a:rPr lang="en-US" b="1" i="1" smtClean="0">
+                                  <a:latin typeface="Cambria Math" panose="02040503050406030204" pitchFamily="18" charset="0"/>
+                                </a:rPr>
+                                <m:t>𝟏</m:t>
+                              </m:r>
+                            </m:sub>
+                          </m:sSub>
+                        </m:e>
+                      </m:d>
+                    </m:oMath>
+                  </m:oMathPara>
+                </a14:m>
+                <a:endParaRPr lang="en-US" b="1" dirty="0"/>
+              </a:p>
+              <a:p>
+                <a:pPr algn="ctr"/>
+                <a:r>
+                  <a:rPr lang="en-US" dirty="0"/>
+                  <a:t>Related to loss at iteration t</a:t>
+                </a:r>
+              </a:p>
+            </p:txBody>
+          </p:sp>
+        </mc:Choice>
+        <mc:Fallback>
+          <p:sp>
+            <p:nvSpPr>
+              <p:cNvPr id="16" name="TextBox 15">
+                <a:extLst>
+                  <a:ext uri="{FF2B5EF4-FFF2-40B4-BE49-F238E27FC236}">
+                    <a16:creationId xmlns:a16="http://schemas.microsoft.com/office/drawing/2014/main" id="{98C218D1-5181-C04D-99ED-1093F1CF3326}"/>
+                  </a:ext>
+                </a:extLst>
+              </p:cNvPr>
+              <p:cNvSpPr txBox="1">
+                <a:spLocks noRot="1" noChangeAspect="1" noMove="1" noResize="1" noEditPoints="1" noAdjustHandles="1" noChangeArrowheads="1" noChangeShapeType="1" noTextEdit="1"/>
+              </p:cNvSpPr>
+              <p:nvPr/>
+            </p:nvSpPr>
+            <p:spPr>
+              <a:xfrm>
+                <a:off x="2260312" y="4709531"/>
+                <a:ext cx="2111076" cy="830997"/>
+              </a:xfrm>
+              <a:prstGeom prst="rect">
+                <a:avLst/>
+              </a:prstGeom>
+              <a:blipFill>
+                <a:blip r:embed="rId8"/>
+                <a:stretch>
+                  <a:fillRect t="-1515" b="-15152"/>
+                </a:stretch>
+              </a:blipFill>
+            </p:spPr>
+            <p:txBody>
+              <a:bodyPr/>
+              <a:lstStyle/>
+              <a:p>
+                <a:r>
+                  <a:rPr lang="en-US">
+                    <a:noFill/>
+                  </a:rPr>
+                  <a:t> </a:t>
+                </a:r>
+              </a:p>
+            </p:txBody>
+          </p:sp>
+        </mc:Fallback>
+      </mc:AlternateContent>
     </p:spTree>
     <p:extLst>
       <p:ext uri="{BB962C8B-B14F-4D97-AF65-F5344CB8AC3E}">

</xml_diff>